<commit_message>
Presentación defensa hecha - definitiva
</commit_message>
<xml_diff>
--- a/doc/presentacoin2.pptx
+++ b/doc/presentacoin2.pptx
@@ -4021,22 +4021,6 @@
               <a:t> es una lesión inflamatoria pulmonar.</a:t>
             </a:r>
           </a:p>
-          <a:p>
-            <a:r>
-              <a:rPr lang="es-ES" b="1" dirty="0"/>
-              <a:t>Está en el día a día </a:t>
-            </a:r>
-            <a:r>
-              <a:rPr lang="es-ES" dirty="0"/>
-              <a:t>entre nosotros y sobre todo después del SARS-CoV2.</a:t>
-            </a:r>
-          </a:p>
-          <a:p>
-            <a:pPr marL="0" indent="0">
-              <a:buNone/>
-            </a:pPr>
-            <a:endParaRPr lang="es-ES" dirty="0"/>
-          </a:p>
         </p:txBody>
       </p:sp>
       <p:pic>
@@ -4061,8 +4045,8 @@
         </p:blipFill>
         <p:spPr>
           <a:xfrm>
-            <a:off x="3124194" y="2703574"/>
-            <a:ext cx="6096012" cy="2182373"/>
+            <a:off x="2507676" y="1905332"/>
+            <a:ext cx="7329048" cy="2623800"/>
           </a:xfrm>
           <a:prstGeom prst="rect">
             <a:avLst/>
@@ -4083,8 +4067,8 @@
         </p:nvSpPr>
         <p:spPr>
           <a:xfrm>
-            <a:off x="3266658" y="4885947"/>
-            <a:ext cx="5658684" cy="276999"/>
+            <a:off x="2507676" y="4529132"/>
+            <a:ext cx="7329048" cy="276999"/>
           </a:xfrm>
           <a:prstGeom prst="rect">
             <a:avLst/>

</xml_diff>